<commit_message>
fix typo and add client flow link
</commit_message>
<xml_diff>
--- a/articles/app-service/media/app-service-authentication-overview/authdiagrams.pptx
+++ b/articles/app-service/media/app-service-authentication-overview/authdiagrams.pptx
@@ -216,7 +216,7 @@
           <a:p>
             <a:fld id="{635C2C29-7B47-4372-966B-1DDD15E36740}" type="datetimeFigureOut">
               <a:rPr lang="en-US" smtClean="0"/>
-              <a:t>6/18/2015</a:t>
+              <a:t>6/19/2015</a:t>
             </a:fld>
             <a:endParaRPr lang="en-US"/>
           </a:p>
@@ -554,7 +554,7 @@
                 </a:solidFill>
               </a:rPr>
               <a:pPr/>
-              <a:t>6/18/2015</a:t>
+              <a:t>6/19/2015</a:t>
             </a:fld>
             <a:endParaRPr lang="en-US" dirty="0">
               <a:solidFill>
@@ -733,7 +733,7 @@
                 </a:solidFill>
               </a:rPr>
               <a:pPr/>
-              <a:t>6/18/2015</a:t>
+              <a:t>6/19/2015</a:t>
             </a:fld>
             <a:endParaRPr lang="en-US" dirty="0">
               <a:solidFill>
@@ -1023,7 +1023,7 @@
           <a:p>
             <a:fld id="{AA65A08F-B81B-480D-A4D4-B1597EB0C00E}" type="datetimeFigureOut">
               <a:rPr lang="en-US" smtClean="0"/>
-              <a:t>6/18/2015</a:t>
+              <a:t>6/19/2015</a:t>
             </a:fld>
             <a:endParaRPr lang="en-US"/>
           </a:p>
@@ -1193,7 +1193,7 @@
           <a:p>
             <a:fld id="{AA65A08F-B81B-480D-A4D4-B1597EB0C00E}" type="datetimeFigureOut">
               <a:rPr lang="en-US" smtClean="0"/>
-              <a:t>6/18/2015</a:t>
+              <a:t>6/19/2015</a:t>
             </a:fld>
             <a:endParaRPr lang="en-US"/>
           </a:p>
@@ -1373,7 +1373,7 @@
           <a:p>
             <a:fld id="{AA65A08F-B81B-480D-A4D4-B1597EB0C00E}" type="datetimeFigureOut">
               <a:rPr lang="en-US" smtClean="0"/>
-              <a:t>6/18/2015</a:t>
+              <a:t>6/19/2015</a:t>
             </a:fld>
             <a:endParaRPr lang="en-US"/>
           </a:p>
@@ -1696,7 +1696,7 @@
           <a:p>
             <a:fld id="{AA65A08F-B81B-480D-A4D4-B1597EB0C00E}" type="datetimeFigureOut">
               <a:rPr lang="en-US" smtClean="0"/>
-              <a:t>6/18/2015</a:t>
+              <a:t>6/19/2015</a:t>
             </a:fld>
             <a:endParaRPr lang="en-US"/>
           </a:p>
@@ -1942,7 +1942,7 @@
           <a:p>
             <a:fld id="{AA65A08F-B81B-480D-A4D4-B1597EB0C00E}" type="datetimeFigureOut">
               <a:rPr lang="en-US" smtClean="0"/>
-              <a:t>6/18/2015</a:t>
+              <a:t>6/19/2015</a:t>
             </a:fld>
             <a:endParaRPr lang="en-US"/>
           </a:p>
@@ -2230,7 +2230,7 @@
           <a:p>
             <a:fld id="{AA65A08F-B81B-480D-A4D4-B1597EB0C00E}" type="datetimeFigureOut">
               <a:rPr lang="en-US" smtClean="0"/>
-              <a:t>6/18/2015</a:t>
+              <a:t>6/19/2015</a:t>
             </a:fld>
             <a:endParaRPr lang="en-US"/>
           </a:p>
@@ -2652,7 +2652,7 @@
           <a:p>
             <a:fld id="{AA65A08F-B81B-480D-A4D4-B1597EB0C00E}" type="datetimeFigureOut">
               <a:rPr lang="en-US" smtClean="0"/>
-              <a:t>6/18/2015</a:t>
+              <a:t>6/19/2015</a:t>
             </a:fld>
             <a:endParaRPr lang="en-US"/>
           </a:p>
@@ -2770,7 +2770,7 @@
           <a:p>
             <a:fld id="{AA65A08F-B81B-480D-A4D4-B1597EB0C00E}" type="datetimeFigureOut">
               <a:rPr lang="en-US" smtClean="0"/>
-              <a:t>6/18/2015</a:t>
+              <a:t>6/19/2015</a:t>
             </a:fld>
             <a:endParaRPr lang="en-US"/>
           </a:p>
@@ -2865,7 +2865,7 @@
           <a:p>
             <a:fld id="{AA65A08F-B81B-480D-A4D4-B1597EB0C00E}" type="datetimeFigureOut">
               <a:rPr lang="en-US" smtClean="0"/>
-              <a:t>6/18/2015</a:t>
+              <a:t>6/19/2015</a:t>
             </a:fld>
             <a:endParaRPr lang="en-US"/>
           </a:p>
@@ -3142,7 +3142,7 @@
           <a:p>
             <a:fld id="{AA65A08F-B81B-480D-A4D4-B1597EB0C00E}" type="datetimeFigureOut">
               <a:rPr lang="en-US" smtClean="0"/>
-              <a:t>6/18/2015</a:t>
+              <a:t>6/19/2015</a:t>
             </a:fld>
             <a:endParaRPr lang="en-US"/>
           </a:p>
@@ -3395,7 +3395,7 @@
           <a:p>
             <a:fld id="{AA65A08F-B81B-480D-A4D4-B1597EB0C00E}" type="datetimeFigureOut">
               <a:rPr lang="en-US" smtClean="0"/>
-              <a:t>6/18/2015</a:t>
+              <a:t>6/19/2015</a:t>
             </a:fld>
             <a:endParaRPr lang="en-US"/>
           </a:p>
@@ -3608,7 +3608,7 @@
           <a:p>
             <a:fld id="{AA65A08F-B81B-480D-A4D4-B1597EB0C00E}" type="datetimeFigureOut">
               <a:rPr lang="en-US" smtClean="0"/>
-              <a:t>6/18/2015</a:t>
+              <a:t>6/19/2015</a:t>
             </a:fld>
             <a:endParaRPr lang="en-US"/>
           </a:p>
@@ -6580,7 +6580,6 @@
               <a:rPr lang="en-US" sz="1400" dirty="0" smtClean="0"/>
               <a:t>API app or Mobile app</a:t>
             </a:r>
-            <a:endParaRPr lang="en-US" sz="1400" dirty="0" smtClean="0"/>
           </a:p>
         </p:txBody>
       </p:sp>
@@ -6711,15 +6710,7 @@
             </a:r>
             <a:r>
               <a:rPr lang="en-US" sz="1400" dirty="0" smtClean="0"/>
-              <a:t>. </a:t>
-            </a:r>
-            <a:r>
-              <a:rPr lang="en-US" sz="1400" dirty="0" smtClean="0"/>
-              <a:t>Provider </a:t>
-            </a:r>
-            <a:r>
-              <a:rPr lang="en-US" sz="1400" dirty="0" smtClean="0"/>
-              <a:t>token</a:t>
+              <a:t>. Provider token</a:t>
             </a:r>
             <a:r>
               <a:rPr lang="en-US" sz="1400" dirty="0"/>
@@ -6729,7 +6720,6 @@
               <a:rPr lang="en-US" sz="1400" dirty="0" smtClean="0"/>
               <a:t>with provider API call</a:t>
             </a:r>
-            <a:endParaRPr lang="en-US" sz="1400" dirty="0" smtClean="0"/>
           </a:p>
         </p:txBody>
       </p:sp>
@@ -6950,11 +6940,7 @@
             </a:r>
             <a:r>
               <a:rPr lang="en-US" sz="1400" dirty="0" smtClean="0"/>
-              <a:t>. </a:t>
-            </a:r>
-            <a:r>
-              <a:rPr lang="en-US" sz="1400" dirty="0" smtClean="0"/>
-              <a:t>Zumo token with request for</a:t>
+              <a:t>. Zumo token with request for</a:t>
             </a:r>
           </a:p>
           <a:p>
@@ -7207,13 +7193,8 @@
           <a:p>
             <a:r>
               <a:rPr lang="en-US" sz="1400" dirty="0" smtClean="0"/>
-              <a:t>1. Zumo </a:t>
-            </a:r>
-            <a:r>
-              <a:rPr lang="en-US" sz="1400" dirty="0" smtClean="0"/>
-              <a:t>token with API call</a:t>
-            </a:r>
-            <a:endParaRPr lang="en-US" sz="1400" dirty="0" smtClean="0"/>
+              <a:t>1. Zumo token with API call</a:t>
+            </a:r>
           </a:p>
         </p:txBody>
       </p:sp>
@@ -7332,7 +7313,6 @@
               <a:rPr lang="en-US" sz="1400" dirty="0" smtClean="0"/>
               <a:t>API app or Mobile app</a:t>
             </a:r>
-            <a:endParaRPr lang="en-US" sz="1400" dirty="0" smtClean="0"/>
           </a:p>
         </p:txBody>
       </p:sp>
@@ -7399,11 +7379,6 @@
               </a:rPr>
               <a:t>SaaS provider</a:t>
             </a:r>
-            <a:endParaRPr lang="en-US" sz="1200" dirty="0" smtClean="0">
-              <a:solidFill>
-                <a:schemeClr val="bg1"/>
-              </a:solidFill>
-            </a:endParaRPr>
           </a:p>
         </p:txBody>
       </p:sp>
@@ -7474,7 +7449,6 @@
               <a:rPr lang="en-US" sz="1400" dirty="0" smtClean="0"/>
               <a:t>. Zumo token with API call</a:t>
             </a:r>
-            <a:endParaRPr lang="en-US" sz="1400" dirty="0" smtClean="0"/>
           </a:p>
         </p:txBody>
       </p:sp>
@@ -7535,13 +7509,8 @@
           <a:p>
             <a:r>
               <a:rPr lang="en-US" sz="1200" dirty="0" smtClean="0"/>
-              <a:t>4. </a:t>
-            </a:r>
-            <a:r>
-              <a:rPr lang="en-US" sz="1200" dirty="0" smtClean="0"/>
-              <a:t>SaaS access token</a:t>
-            </a:r>
-            <a:endParaRPr lang="en-US" sz="1200" dirty="0" smtClean="0"/>
+              <a:t>4. SaaS access token</a:t>
+            </a:r>
           </a:p>
         </p:txBody>
       </p:sp>
@@ -7887,7 +7856,6 @@
               <a:rPr lang="en-US" sz="1200" dirty="0" smtClean="0"/>
               <a:t>1. Send Zumo token, get back  consent link URL</a:t>
             </a:r>
-            <a:endParaRPr lang="en-US" sz="1200" dirty="0" smtClean="0"/>
           </a:p>
         </p:txBody>
       </p:sp>
@@ -7954,7 +7922,6 @@
               <a:rPr lang="en-US" sz="1200" dirty="0" smtClean="0"/>
               <a:t>2.Browser goes to consent link URL at gateway</a:t>
             </a:r>
-            <a:endParaRPr lang="en-US" sz="1200" dirty="0" smtClean="0"/>
           </a:p>
         </p:txBody>
       </p:sp>
@@ -8019,11 +7986,7 @@
           <a:p>
             <a:r>
               <a:rPr lang="en-US" sz="1200" dirty="0" smtClean="0"/>
-              <a:t>3</a:t>
-            </a:r>
-            <a:r>
-              <a:rPr lang="en-US" sz="1200" dirty="0" smtClean="0"/>
-              <a:t>. Redirect to SaaS login page.</a:t>
+              <a:t>3. Redirect to SaaS login page.</a:t>
             </a:r>
           </a:p>
           <a:p>
@@ -8065,13 +8028,8 @@
             </a:r>
             <a:r>
               <a:rPr lang="en-US" sz="1200" dirty="0" smtClean="0"/>
-              <a:t>. Send Zumo token, get back </a:t>
-            </a:r>
-            <a:r>
-              <a:rPr lang="en-US" sz="1200" dirty="0" smtClean="0"/>
-              <a:t>SaaS access token</a:t>
-            </a:r>
-            <a:endParaRPr lang="en-US" sz="1200" dirty="0" smtClean="0"/>
+              <a:t>. Send Zumo token, get back SaaS access token</a:t>
+            </a:r>
           </a:p>
         </p:txBody>
       </p:sp>
@@ -8138,17 +8096,12 @@
           <a:p>
             <a:r>
               <a:rPr lang="en-US" sz="1200" dirty="0" smtClean="0"/>
-              <a:t>8</a:t>
-            </a:r>
-            <a:r>
-              <a:rPr lang="en-US" sz="1200" dirty="0" smtClean="0"/>
-              <a:t>. </a:t>
+              <a:t>7. </a:t>
             </a:r>
             <a:r>
               <a:rPr lang="en-US" sz="1200" dirty="0" smtClean="0"/>
               <a:t>SaaS access token with SaaS API call</a:t>
             </a:r>
-            <a:endParaRPr lang="en-US" sz="1200" dirty="0" smtClean="0"/>
           </a:p>
         </p:txBody>
       </p:sp>
@@ -8267,7 +8220,6 @@
               <a:rPr lang="en-US" sz="1400" dirty="0" smtClean="0"/>
               <a:t>API app or Mobile app</a:t>
             </a:r>
-            <a:endParaRPr lang="en-US" sz="1400" dirty="0" smtClean="0"/>
           </a:p>
         </p:txBody>
       </p:sp>
@@ -8456,13 +8408,8 @@
           <a:p>
             <a:r>
               <a:rPr lang="en-US" sz="1400" dirty="0" smtClean="0"/>
-              <a:t>2. </a:t>
-            </a:r>
-            <a:r>
-              <a:rPr lang="en-US" sz="1400" dirty="0" smtClean="0"/>
-              <a:t>Consent link URL</a:t>
-            </a:r>
-            <a:endParaRPr lang="en-US" sz="1400" dirty="0" smtClean="0"/>
+              <a:t>2. Consent link URL</a:t>
+            </a:r>
           </a:p>
         </p:txBody>
       </p:sp>
@@ -8607,7 +8554,6 @@
               <a:rPr lang="en-US" sz="1400" dirty="0" smtClean="0"/>
               <a:t>consent link</a:t>
             </a:r>
-            <a:endParaRPr lang="en-US" sz="1400" dirty="0" smtClean="0"/>
           </a:p>
         </p:txBody>
       </p:sp>
@@ -10481,12 +10427,9 @@
 </file>
 
 <file path=customXml/item1.xml><?xml version="1.0" encoding="utf-8"?>
-<?mso-contentType ?>
-<FormTemplates xmlns="http://schemas.microsoft.com/sharepoint/v3/contenttype/forms">
-  <Display>DocumentLibraryForm</Display>
-  <Edit>DocumentLibraryForm</Edit>
-  <New>DocumentLibraryForm</New>
-</FormTemplates>
+<p:properties xmlns:p="http://schemas.microsoft.com/office/2006/metadata/properties" xmlns:xsi="http://www.w3.org/2001/XMLSchema-instance" xmlns:pc="http://schemas.microsoft.com/office/infopath/2007/PartnerControls">
+  <documentManagement/>
+</p:properties>
 </file>
 
 <file path=customXml/item2.xml><?xml version="1.0" encoding="utf-8"?>
@@ -10630,15 +10573,26 @@
 </file>
 
 <file path=customXml/item3.xml><?xml version="1.0" encoding="utf-8"?>
-<p:properties xmlns:p="http://schemas.microsoft.com/office/2006/metadata/properties" xmlns:xsi="http://www.w3.org/2001/XMLSchema-instance" xmlns:pc="http://schemas.microsoft.com/office/infopath/2007/PartnerControls">
-  <documentManagement/>
-</p:properties>
+<?mso-contentType ?>
+<FormTemplates xmlns="http://schemas.microsoft.com/sharepoint/v3/contenttype/forms">
+  <Display>DocumentLibraryForm</Display>
+  <Edit>DocumentLibraryForm</Edit>
+  <New>DocumentLibraryForm</New>
+</FormTemplates>
 </file>
 
 <file path=customXml/itemProps1.xml><?xml version="1.0" encoding="utf-8"?>
-<ds:datastoreItem xmlns:ds="http://schemas.openxmlformats.org/officeDocument/2006/customXml" ds:itemID="{ACB5FBA3-1D1F-439A-A4B5-922BBD9B88B8}">
+<ds:datastoreItem xmlns:ds="http://schemas.openxmlformats.org/officeDocument/2006/customXml" ds:itemID="{61ADBFCF-2128-4158-9103-1352F80D9458}">
   <ds:schemaRefs>
-    <ds:schemaRef ds:uri="http://schemas.microsoft.com/sharepoint/v3/contenttype/forms"/>
+    <ds:schemaRef ds:uri="http://purl.org/dc/terms/"/>
+    <ds:schemaRef ds:uri="http://purl.org/dc/dcmitype/"/>
+    <ds:schemaRef ds:uri="20591bfd-c086-4ac3-b727-64c5048ce186"/>
+    <ds:schemaRef ds:uri="http://schemas.openxmlformats.org/package/2006/metadata/core-properties"/>
+    <ds:schemaRef ds:uri="http://purl.org/dc/elements/1.1/"/>
+    <ds:schemaRef ds:uri="http://schemas.microsoft.com/office/2006/documentManagement/types"/>
+    <ds:schemaRef ds:uri="http://schemas.microsoft.com/office/infopath/2007/PartnerControls"/>
+    <ds:schemaRef ds:uri="http://schemas.microsoft.com/office/2006/metadata/properties"/>
+    <ds:schemaRef ds:uri="http://www.w3.org/XML/1998/namespace"/>
   </ds:schemaRefs>
 </ds:datastoreItem>
 </file>
@@ -10662,17 +10616,9 @@
 </file>
 
 <file path=customXml/itemProps3.xml><?xml version="1.0" encoding="utf-8"?>
-<ds:datastoreItem xmlns:ds="http://schemas.openxmlformats.org/officeDocument/2006/customXml" ds:itemID="{61ADBFCF-2128-4158-9103-1352F80D9458}">
+<ds:datastoreItem xmlns:ds="http://schemas.openxmlformats.org/officeDocument/2006/customXml" ds:itemID="{ACB5FBA3-1D1F-439A-A4B5-922BBD9B88B8}">
   <ds:schemaRefs>
-    <ds:schemaRef ds:uri="http://purl.org/dc/terms/"/>
-    <ds:schemaRef ds:uri="http://purl.org/dc/dcmitype/"/>
-    <ds:schemaRef ds:uri="20591bfd-c086-4ac3-b727-64c5048ce186"/>
-    <ds:schemaRef ds:uri="http://schemas.openxmlformats.org/package/2006/metadata/core-properties"/>
-    <ds:schemaRef ds:uri="http://purl.org/dc/elements/1.1/"/>
-    <ds:schemaRef ds:uri="http://schemas.microsoft.com/office/2006/documentManagement/types"/>
-    <ds:schemaRef ds:uri="http://schemas.microsoft.com/office/infopath/2007/PartnerControls"/>
-    <ds:schemaRef ds:uri="http://schemas.microsoft.com/office/2006/metadata/properties"/>
-    <ds:schemaRef ds:uri="http://www.w3.org/XML/1998/namespace"/>
+    <ds:schemaRef ds:uri="http://schemas.microsoft.com/sharepoint/v3/contenttype/forms"/>
   </ds:schemaRefs>
 </ds:datastoreItem>
 </file>
</xml_diff>